<commit_message>
trying one more time, as mso heads not working anymore
</commit_message>
<xml_diff>
--- a/features/steps/test_files/dml-line.pptx
+++ b/features/steps/test_files/dml-line.pptx
@@ -9,6 +9,7 @@
     <p:sldId id="257" r:id="rId3"/>
     <p:sldId id="258" r:id="rId4"/>
     <p:sldId id="259" r:id="rId5"/>
+    <p:sldId id="260" r:id="rId6"/>
   </p:sldIdLst>
   <p:sldSz cx="9144000" cy="6858000" type="screen4x3"/>
   <p:notesSz cx="6858000" cy="9144000"/>
@@ -107,6 +108,22 @@
       </a:defRPr>
     </a:lvl9pPr>
   </p:defaultTextStyle>
+  <p:extLst>
+    <p:ext uri="{EFAFB233-063F-42B5-8137-9DF3F51BA10A}">
+      <p15:sldGuideLst xmlns:p15="http://schemas.microsoft.com/office/powerpoint/2012/main">
+        <p15:guide id="1" orient="horz" pos="2160">
+          <p15:clr>
+            <a:srgbClr val="A4A3A4"/>
+          </p15:clr>
+        </p15:guide>
+        <p15:guide id="2" pos="2880">
+          <p15:clr>
+            <a:srgbClr val="A4A3A4"/>
+          </p15:clr>
+        </p15:guide>
+      </p15:sldGuideLst>
+    </p:ext>
+  </p:extLst>
 </p:presentation>
 </file>
 
@@ -1017,11 +1034,7 @@
             <a:pPr algn="ctr"/>
             <a:r>
               <a:rPr lang="en-US" sz="1200" dirty="0" smtClean="0"/>
-              <a:t>Inherited </a:t>
-            </a:r>
-            <a:r>
-              <a:rPr lang="en-US" sz="1200" dirty="0" smtClean="0"/>
-              <a:t>Line</a:t>
+              <a:t>Inherited Line</a:t>
             </a:r>
             <a:br>
               <a:rPr lang="en-US" sz="1200" dirty="0" smtClean="0"/>
@@ -1169,16 +1182,6 @@
               </a:rPr>
               <a:t>Dash</a:t>
             </a:r>
-            <a:r>
-              <a:rPr lang="en-US" sz="1200" dirty="0" smtClean="0">
-                <a:solidFill>
-                  <a:schemeClr val="accent1">
-                    <a:lumMod val="75000"/>
-                  </a:schemeClr>
-                </a:solidFill>
-              </a:rPr>
-              <a:t/>
-            </a:r>
             <a:br>
               <a:rPr lang="en-US" sz="1200" dirty="0" smtClean="0">
                 <a:solidFill>
@@ -1261,16 +1264,6 @@
               </a:rPr>
               <a:t>Dash-dot</a:t>
             </a:r>
-            <a:r>
-              <a:rPr lang="en-US" sz="1200" dirty="0" smtClean="0">
-                <a:solidFill>
-                  <a:schemeClr val="accent1">
-                    <a:lumMod val="75000"/>
-                  </a:schemeClr>
-                </a:solidFill>
-              </a:rPr>
-              <a:t/>
-            </a:r>
             <a:br>
               <a:rPr lang="en-US" sz="1200" dirty="0" smtClean="0">
                 <a:solidFill>
@@ -1304,6 +1297,333 @@
     <p:extLst>
       <p:ext uri="{BB962C8B-B14F-4D97-AF65-F5344CB8AC3E}">
         <p14:creationId xmlns:p14="http://schemas.microsoft.com/office/powerpoint/2010/main" val="3482779864"/>
+      </p:ext>
+    </p:extLst>
+  </p:cSld>
+  <p:clrMapOvr>
+    <a:masterClrMapping/>
+  </p:clrMapOvr>
+</p:sld>
+</file>
+
+<file path=ppt/slides/slide5.xml><?xml version="1.0" encoding="utf-8"?>
+<p:sld xmlns:a="http://schemas.openxmlformats.org/drawingml/2006/main" xmlns:r="http://schemas.openxmlformats.org/officeDocument/2006/relationships" xmlns:p="http://schemas.openxmlformats.org/presentationml/2006/main">
+  <p:cSld>
+    <p:spTree>
+      <p:nvGrpSpPr>
+        <p:cNvPr id="1" name=""/>
+        <p:cNvGrpSpPr/>
+        <p:nvPr/>
+      </p:nvGrpSpPr>
+      <p:grpSpPr>
+        <a:xfrm>
+          <a:off x="0" y="0"/>
+          <a:ext cx="0" cy="0"/>
+          <a:chOff x="0" y="0"/>
+          <a:chExt cx="0" cy="0"/>
+        </a:xfrm>
+      </p:grpSpPr>
+      <p:sp>
+        <p:nvSpPr>
+          <p:cNvPr id="11" name="TextBox 10"/>
+          <p:cNvSpPr txBox="1"/>
+          <p:nvPr/>
+        </p:nvSpPr>
+        <p:spPr>
+          <a:xfrm>
+            <a:off x="2987824" y="2492896"/>
+            <a:ext cx="1152128" cy="646331"/>
+          </a:xfrm>
+          <a:prstGeom prst="rect">
+            <a:avLst/>
+          </a:prstGeom>
+          <a:noFill/>
+        </p:spPr>
+        <p:txBody>
+          <a:bodyPr wrap="square" rtlCol="0">
+            <a:spAutoFit/>
+          </a:bodyPr>
+          <a:lstStyle/>
+          <a:p>
+            <a:pPr algn="ctr"/>
+            <a:r>
+              <a:rPr lang="en-US" sz="1200" dirty="0" smtClean="0"/>
+              <a:t>Diamond</a:t>
+            </a:r>
+          </a:p>
+          <a:p>
+            <a:pPr algn="ctr"/>
+            <a:r>
+              <a:rPr lang="en-US" sz="1200" dirty="0" smtClean="0"/>
+              <a:t>line ends</a:t>
+            </a:r>
+            <a:endParaRPr lang="en-US" sz="1200" dirty="0"/>
+          </a:p>
+          <a:p>
+            <a:endParaRPr lang="en-US" sz="1200" dirty="0"/>
+          </a:p>
+        </p:txBody>
+      </p:sp>
+      <p:sp>
+        <p:nvSpPr>
+          <p:cNvPr id="9" name="TextBox 8"/>
+          <p:cNvSpPr txBox="1"/>
+          <p:nvPr/>
+        </p:nvSpPr>
+        <p:spPr>
+          <a:xfrm>
+            <a:off x="1043608" y="1556792"/>
+            <a:ext cx="1152128" cy="646331"/>
+          </a:xfrm>
+          <a:prstGeom prst="rect">
+            <a:avLst/>
+          </a:prstGeom>
+          <a:noFill/>
+        </p:spPr>
+        <p:txBody>
+          <a:bodyPr wrap="square" rtlCol="0">
+            <a:spAutoFit/>
+          </a:bodyPr>
+          <a:lstStyle/>
+          <a:p>
+            <a:pPr algn="ctr"/>
+            <a:r>
+              <a:rPr lang="en-US" sz="1200" dirty="0"/>
+              <a:t>Inherited </a:t>
+            </a:r>
+            <a:endParaRPr lang="en-US" sz="1200" dirty="0" smtClean="0"/>
+          </a:p>
+          <a:p>
+            <a:pPr algn="ctr"/>
+            <a:r>
+              <a:rPr lang="en-US" sz="1200" dirty="0" smtClean="0"/>
+              <a:t>line ends</a:t>
+            </a:r>
+            <a:endParaRPr lang="en-US" sz="1200" dirty="0"/>
+          </a:p>
+          <a:p>
+            <a:endParaRPr lang="en-US" sz="1200" dirty="0"/>
+          </a:p>
+        </p:txBody>
+      </p:sp>
+      <p:cxnSp>
+        <p:nvCxnSpPr>
+          <p:cNvPr id="7" name="Straight Connector 6"/>
+          <p:cNvCxnSpPr/>
+          <p:nvPr/>
+        </p:nvCxnSpPr>
+        <p:spPr>
+          <a:xfrm>
+            <a:off x="1043608" y="1988840"/>
+            <a:ext cx="1152128" cy="0"/>
+          </a:xfrm>
+          <a:prstGeom prst="line">
+            <a:avLst/>
+          </a:prstGeom>
+        </p:spPr>
+        <p:style>
+          <a:lnRef idx="1">
+            <a:schemeClr val="accent1"/>
+          </a:lnRef>
+          <a:fillRef idx="0">
+            <a:schemeClr val="accent1"/>
+          </a:fillRef>
+          <a:effectRef idx="0">
+            <a:schemeClr val="accent1"/>
+          </a:effectRef>
+          <a:fontRef idx="minor">
+            <a:schemeClr val="tx1"/>
+          </a:fontRef>
+        </p:style>
+      </p:cxnSp>
+      <p:cxnSp>
+        <p:nvCxnSpPr>
+          <p:cNvPr id="10" name="Straight Connector 9"/>
+          <p:cNvCxnSpPr/>
+          <p:nvPr/>
+        </p:nvCxnSpPr>
+        <p:spPr>
+          <a:xfrm>
+            <a:off x="2987824" y="2924944"/>
+            <a:ext cx="1152128" cy="0"/>
+          </a:xfrm>
+          <a:prstGeom prst="line">
+            <a:avLst/>
+          </a:prstGeom>
+          <a:ln>
+            <a:headEnd type="diamond"/>
+            <a:tailEnd type="diamond"/>
+          </a:ln>
+        </p:spPr>
+        <p:style>
+          <a:lnRef idx="1">
+            <a:schemeClr val="accent1"/>
+          </a:lnRef>
+          <a:fillRef idx="0">
+            <a:schemeClr val="accent1"/>
+          </a:fillRef>
+          <a:effectRef idx="0">
+            <a:schemeClr val="accent1"/>
+          </a:effectRef>
+          <a:fontRef idx="minor">
+            <a:schemeClr val="tx1"/>
+          </a:fontRef>
+        </p:style>
+      </p:cxnSp>
+      <p:sp>
+        <p:nvSpPr>
+          <p:cNvPr id="12" name="TextBox 11"/>
+          <p:cNvSpPr txBox="1"/>
+          <p:nvPr/>
+        </p:nvSpPr>
+        <p:spPr>
+          <a:xfrm>
+            <a:off x="5292080" y="3861048"/>
+            <a:ext cx="1152128" cy="646331"/>
+          </a:xfrm>
+          <a:prstGeom prst="rect">
+            <a:avLst/>
+          </a:prstGeom>
+          <a:noFill/>
+        </p:spPr>
+        <p:txBody>
+          <a:bodyPr wrap="square" rtlCol="0">
+            <a:spAutoFit/>
+          </a:bodyPr>
+          <a:lstStyle/>
+          <a:p>
+            <a:pPr algn="ctr"/>
+            <a:r>
+              <a:rPr lang="en-US" sz="1200" dirty="0" smtClean="0"/>
+              <a:t>Triangle</a:t>
+            </a:r>
+          </a:p>
+          <a:p>
+            <a:pPr algn="ctr"/>
+            <a:r>
+              <a:rPr lang="en-US" sz="1200" dirty="0" smtClean="0"/>
+              <a:t>line ends</a:t>
+            </a:r>
+            <a:endParaRPr lang="en-US" sz="1200" dirty="0"/>
+          </a:p>
+          <a:p>
+            <a:endParaRPr lang="en-US" sz="1200" dirty="0"/>
+          </a:p>
+        </p:txBody>
+      </p:sp>
+      <p:cxnSp>
+        <p:nvCxnSpPr>
+          <p:cNvPr id="13" name="Straight Connector 12"/>
+          <p:cNvCxnSpPr/>
+          <p:nvPr/>
+        </p:nvCxnSpPr>
+        <p:spPr>
+          <a:xfrm>
+            <a:off x="5292080" y="4293096"/>
+            <a:ext cx="1152128" cy="0"/>
+          </a:xfrm>
+          <a:prstGeom prst="line">
+            <a:avLst/>
+          </a:prstGeom>
+          <a:ln>
+            <a:headEnd type="triangle"/>
+            <a:tailEnd type="triangle"/>
+          </a:ln>
+        </p:spPr>
+        <p:style>
+          <a:lnRef idx="1">
+            <a:schemeClr val="accent1"/>
+          </a:lnRef>
+          <a:fillRef idx="0">
+            <a:schemeClr val="accent1"/>
+          </a:fillRef>
+          <a:effectRef idx="0">
+            <a:schemeClr val="accent1"/>
+          </a:effectRef>
+          <a:fontRef idx="minor">
+            <a:schemeClr val="tx1"/>
+          </a:fontRef>
+        </p:style>
+      </p:cxnSp>
+      <p:sp>
+        <p:nvSpPr>
+          <p:cNvPr id="14" name="TextBox 13"/>
+          <p:cNvSpPr txBox="1"/>
+          <p:nvPr/>
+        </p:nvSpPr>
+        <p:spPr>
+          <a:xfrm>
+            <a:off x="7236296" y="5157192"/>
+            <a:ext cx="1152128" cy="646331"/>
+          </a:xfrm>
+          <a:prstGeom prst="rect">
+            <a:avLst/>
+          </a:prstGeom>
+          <a:noFill/>
+        </p:spPr>
+        <p:txBody>
+          <a:bodyPr wrap="square" rtlCol="0">
+            <a:spAutoFit/>
+          </a:bodyPr>
+          <a:lstStyle/>
+          <a:p>
+            <a:pPr algn="ctr"/>
+            <a:r>
+              <a:rPr lang="en-US" sz="1200" dirty="0" smtClean="0"/>
+              <a:t>Oval</a:t>
+            </a:r>
+          </a:p>
+          <a:p>
+            <a:pPr algn="ctr"/>
+            <a:r>
+              <a:rPr lang="en-US" sz="1200" dirty="0" smtClean="0"/>
+              <a:t>line ends</a:t>
+            </a:r>
+            <a:endParaRPr lang="en-US" sz="1200" dirty="0"/>
+          </a:p>
+          <a:p>
+            <a:endParaRPr lang="en-US" sz="1200" dirty="0"/>
+          </a:p>
+        </p:txBody>
+      </p:sp>
+      <p:cxnSp>
+        <p:nvCxnSpPr>
+          <p:cNvPr id="15" name="Straight Connector 14"/>
+          <p:cNvCxnSpPr/>
+          <p:nvPr/>
+        </p:nvCxnSpPr>
+        <p:spPr>
+          <a:xfrm>
+            <a:off x="7236296" y="5589240"/>
+            <a:ext cx="1152128" cy="0"/>
+          </a:xfrm>
+          <a:prstGeom prst="line">
+            <a:avLst/>
+          </a:prstGeom>
+          <a:ln>
+            <a:headEnd type="oval"/>
+            <a:tailEnd type="oval"/>
+          </a:ln>
+        </p:spPr>
+        <p:style>
+          <a:lnRef idx="1">
+            <a:schemeClr val="accent1"/>
+          </a:lnRef>
+          <a:fillRef idx="0">
+            <a:schemeClr val="accent1"/>
+          </a:fillRef>
+          <a:effectRef idx="0">
+            <a:schemeClr val="accent1"/>
+          </a:effectRef>
+          <a:fontRef idx="minor">
+            <a:schemeClr val="tx1"/>
+          </a:fontRef>
+        </p:style>
+      </p:cxnSp>
+    </p:spTree>
+    <p:extLst>
+      <p:ext uri="{BB962C8B-B14F-4D97-AF65-F5344CB8AC3E}">
+        <p14:creationId xmlns:p14="http://schemas.microsoft.com/office/powerpoint/2010/main" val="2620155801"/>
       </p:ext>
     </p:extLst>
   </p:cSld>

</xml_diff>